<commit_message>
made a new figure
</commit_message>
<xml_diff>
--- a/figures/preliminary-figures/TOC.pptx
+++ b/figures/preliminary-figures/TOC.pptx
@@ -114,6 +114,211 @@
 </p:presentation>
 </file>
 
+<file path=ppt/revisionInfo.xml><?xml version="1.0" encoding="utf-8"?>
+<p1510:revInfo xmlns:a="http://schemas.openxmlformats.org/drawingml/2006/main" xmlns:r="http://schemas.openxmlformats.org/officeDocument/2006/relationships" xmlns:p1510="http://schemas.microsoft.com/office/powerpoint/2015/10/main">
+  <p1510:revLst>
+    <p1510:client id="{A5D23ACE-F9BA-49A9-BAD5-57D3CE328640}" v="37" dt="2022-11-18T13:32:20.724"/>
+  </p1510:revLst>
+</p1510:revInfo>
+</file>
+
+<file path=ppt/changesInfos/changesInfo1.xml><?xml version="1.0" encoding="utf-8"?>
+<pc:chgInfo xmlns:a="http://schemas.openxmlformats.org/drawingml/2006/main" xmlns:r="http://schemas.openxmlformats.org/officeDocument/2006/relationships" xmlns:ac="http://schemas.microsoft.com/office/drawing/2013/main/command" xmlns:pc="http://schemas.microsoft.com/office/powerpoint/2013/main/command">
+  <pc:docChgLst>
+    <pc:chgData name="Sandra Klemet-N'guessan" userId="0d19dd2d-6e00-409e-9933-e191f280205d" providerId="ADAL" clId="{A5D23ACE-F9BA-49A9-BAD5-57D3CE328640}"/>
+    <pc:docChg chg="undo custSel modSld">
+      <pc:chgData name="Sandra Klemet-N'guessan" userId="0d19dd2d-6e00-409e-9933-e191f280205d" providerId="ADAL" clId="{A5D23ACE-F9BA-49A9-BAD5-57D3CE328640}" dt="2022-11-18T13:36:43.682" v="83" actId="1076"/>
+      <pc:docMkLst>
+        <pc:docMk/>
+      </pc:docMkLst>
+      <pc:sldChg chg="addSp delSp modSp mod">
+        <pc:chgData name="Sandra Klemet-N'guessan" userId="0d19dd2d-6e00-409e-9933-e191f280205d" providerId="ADAL" clId="{A5D23ACE-F9BA-49A9-BAD5-57D3CE328640}" dt="2022-11-18T13:36:43.682" v="83" actId="1076"/>
+        <pc:sldMkLst>
+          <pc:docMk/>
+          <pc:sldMk cId="1778605326" sldId="257"/>
+        </pc:sldMkLst>
+        <pc:spChg chg="mod">
+          <ac:chgData name="Sandra Klemet-N'guessan" userId="0d19dd2d-6e00-409e-9933-e191f280205d" providerId="ADAL" clId="{A5D23ACE-F9BA-49A9-BAD5-57D3CE328640}" dt="2022-11-18T13:36:21.870" v="79" actId="1076"/>
+          <ac:spMkLst>
+            <pc:docMk/>
+            <pc:sldMk cId="1778605326" sldId="257"/>
+            <ac:spMk id="2" creationId="{0F64992A-7B73-449F-B552-CF17CAF6F3BD}"/>
+          </ac:spMkLst>
+        </pc:spChg>
+        <pc:spChg chg="mod">
+          <ac:chgData name="Sandra Klemet-N'guessan" userId="0d19dd2d-6e00-409e-9933-e191f280205d" providerId="ADAL" clId="{A5D23ACE-F9BA-49A9-BAD5-57D3CE328640}" dt="2022-11-18T13:36:21.870" v="79" actId="1076"/>
+          <ac:spMkLst>
+            <pc:docMk/>
+            <pc:sldMk cId="1778605326" sldId="257"/>
+            <ac:spMk id="12" creationId="{06886D1F-3E64-478A-AC5B-D428C315D82B}"/>
+          </ac:spMkLst>
+        </pc:spChg>
+        <pc:spChg chg="mod">
+          <ac:chgData name="Sandra Klemet-N'guessan" userId="0d19dd2d-6e00-409e-9933-e191f280205d" providerId="ADAL" clId="{A5D23ACE-F9BA-49A9-BAD5-57D3CE328640}" dt="2022-11-18T13:36:21.870" v="79" actId="1076"/>
+          <ac:spMkLst>
+            <pc:docMk/>
+            <pc:sldMk cId="1778605326" sldId="257"/>
+            <ac:spMk id="14" creationId="{D92F8FDD-6433-4BEE-9442-54468FF753A7}"/>
+          </ac:spMkLst>
+        </pc:spChg>
+        <pc:spChg chg="mod">
+          <ac:chgData name="Sandra Klemet-N'guessan" userId="0d19dd2d-6e00-409e-9933-e191f280205d" providerId="ADAL" clId="{A5D23ACE-F9BA-49A9-BAD5-57D3CE328640}" dt="2022-11-18T13:34:15.104" v="68" actId="1076"/>
+          <ac:spMkLst>
+            <pc:docMk/>
+            <pc:sldMk cId="1778605326" sldId="257"/>
+            <ac:spMk id="15" creationId="{5261465D-DF45-4B6A-9411-59EE670F8141}"/>
+          </ac:spMkLst>
+        </pc:spChg>
+        <pc:spChg chg="mod">
+          <ac:chgData name="Sandra Klemet-N'guessan" userId="0d19dd2d-6e00-409e-9933-e191f280205d" providerId="ADAL" clId="{A5D23ACE-F9BA-49A9-BAD5-57D3CE328640}" dt="2022-11-18T13:36:21.870" v="79" actId="1076"/>
+          <ac:spMkLst>
+            <pc:docMk/>
+            <pc:sldMk cId="1778605326" sldId="257"/>
+            <ac:spMk id="16" creationId="{805B7648-0611-4E1D-B574-AB79DE14553C}"/>
+          </ac:spMkLst>
+        </pc:spChg>
+        <pc:spChg chg="mod">
+          <ac:chgData name="Sandra Klemet-N'guessan" userId="0d19dd2d-6e00-409e-9933-e191f280205d" providerId="ADAL" clId="{A5D23ACE-F9BA-49A9-BAD5-57D3CE328640}" dt="2022-11-18T13:34:15.104" v="68" actId="1076"/>
+          <ac:spMkLst>
+            <pc:docMk/>
+            <pc:sldMk cId="1778605326" sldId="257"/>
+            <ac:spMk id="17" creationId="{DD93AE7F-B4F0-4B3B-9C14-BDA05426589F}"/>
+          </ac:spMkLst>
+        </pc:spChg>
+        <pc:spChg chg="mod">
+          <ac:chgData name="Sandra Klemet-N'guessan" userId="0d19dd2d-6e00-409e-9933-e191f280205d" providerId="ADAL" clId="{A5D23ACE-F9BA-49A9-BAD5-57D3CE328640}" dt="2022-11-18T13:34:15.104" v="68" actId="1076"/>
+          <ac:spMkLst>
+            <pc:docMk/>
+            <pc:sldMk cId="1778605326" sldId="257"/>
+            <ac:spMk id="18" creationId="{0B47404B-A494-40B1-8F5A-C119B4E61928}"/>
+          </ac:spMkLst>
+        </pc:spChg>
+        <pc:spChg chg="mod">
+          <ac:chgData name="Sandra Klemet-N'guessan" userId="0d19dd2d-6e00-409e-9933-e191f280205d" providerId="ADAL" clId="{A5D23ACE-F9BA-49A9-BAD5-57D3CE328640}" dt="2022-11-18T13:36:21.870" v="79" actId="1076"/>
+          <ac:spMkLst>
+            <pc:docMk/>
+            <pc:sldMk cId="1778605326" sldId="257"/>
+            <ac:spMk id="19" creationId="{E473480A-4E66-4B4E-BC45-AE9A6E0303D9}"/>
+          </ac:spMkLst>
+        </pc:spChg>
+        <pc:spChg chg="mod">
+          <ac:chgData name="Sandra Klemet-N'guessan" userId="0d19dd2d-6e00-409e-9933-e191f280205d" providerId="ADAL" clId="{A5D23ACE-F9BA-49A9-BAD5-57D3CE328640}" dt="2022-11-18T13:34:15.104" v="68" actId="1076"/>
+          <ac:spMkLst>
+            <pc:docMk/>
+            <pc:sldMk cId="1778605326" sldId="257"/>
+            <ac:spMk id="20" creationId="{EC289D07-EAEA-4271-B7D7-378CF2F84896}"/>
+          </ac:spMkLst>
+        </pc:spChg>
+        <pc:spChg chg="mod">
+          <ac:chgData name="Sandra Klemet-N'guessan" userId="0d19dd2d-6e00-409e-9933-e191f280205d" providerId="ADAL" clId="{A5D23ACE-F9BA-49A9-BAD5-57D3CE328640}" dt="2022-11-18T13:34:15.104" v="68" actId="1076"/>
+          <ac:spMkLst>
+            <pc:docMk/>
+            <pc:sldMk cId="1778605326" sldId="257"/>
+            <ac:spMk id="23" creationId="{17371420-4BBF-4795-A084-29EE984A8D3D}"/>
+          </ac:spMkLst>
+        </pc:spChg>
+        <pc:spChg chg="mod">
+          <ac:chgData name="Sandra Klemet-N'guessan" userId="0d19dd2d-6e00-409e-9933-e191f280205d" providerId="ADAL" clId="{A5D23ACE-F9BA-49A9-BAD5-57D3CE328640}" dt="2022-11-18T13:34:15.104" v="68" actId="1076"/>
+          <ac:spMkLst>
+            <pc:docMk/>
+            <pc:sldMk cId="1778605326" sldId="257"/>
+            <ac:spMk id="24" creationId="{DA1DE8B1-000A-4649-8027-2373A48AFA61}"/>
+          </ac:spMkLst>
+        </pc:spChg>
+        <pc:spChg chg="mod">
+          <ac:chgData name="Sandra Klemet-N'guessan" userId="0d19dd2d-6e00-409e-9933-e191f280205d" providerId="ADAL" clId="{A5D23ACE-F9BA-49A9-BAD5-57D3CE328640}" dt="2022-11-18T13:34:15.104" v="68" actId="1076"/>
+          <ac:spMkLst>
+            <pc:docMk/>
+            <pc:sldMk cId="1778605326" sldId="257"/>
+            <ac:spMk id="25" creationId="{497199EA-B014-42B9-91C9-19C98C1AA4BF}"/>
+          </ac:spMkLst>
+        </pc:spChg>
+        <pc:spChg chg="mod">
+          <ac:chgData name="Sandra Klemet-N'guessan" userId="0d19dd2d-6e00-409e-9933-e191f280205d" providerId="ADAL" clId="{A5D23ACE-F9BA-49A9-BAD5-57D3CE328640}" dt="2022-11-18T13:34:15.104" v="68" actId="1076"/>
+          <ac:spMkLst>
+            <pc:docMk/>
+            <pc:sldMk cId="1778605326" sldId="257"/>
+            <ac:spMk id="26" creationId="{E11A265D-510A-46F9-BBF6-68C579CE4F43}"/>
+          </ac:spMkLst>
+        </pc:spChg>
+        <pc:spChg chg="mod">
+          <ac:chgData name="Sandra Klemet-N'guessan" userId="0d19dd2d-6e00-409e-9933-e191f280205d" providerId="ADAL" clId="{A5D23ACE-F9BA-49A9-BAD5-57D3CE328640}" dt="2022-11-18T13:36:21.870" v="79" actId="1076"/>
+          <ac:spMkLst>
+            <pc:docMk/>
+            <pc:sldMk cId="1778605326" sldId="257"/>
+            <ac:spMk id="63" creationId="{8F331E87-3E27-4660-828B-0D2D47A0430C}"/>
+          </ac:spMkLst>
+        </pc:spChg>
+        <pc:spChg chg="mod">
+          <ac:chgData name="Sandra Klemet-N'guessan" userId="0d19dd2d-6e00-409e-9933-e191f280205d" providerId="ADAL" clId="{A5D23ACE-F9BA-49A9-BAD5-57D3CE328640}" dt="2022-11-18T13:34:15.104" v="68" actId="1076"/>
+          <ac:spMkLst>
+            <pc:docMk/>
+            <pc:sldMk cId="1778605326" sldId="257"/>
+            <ac:spMk id="66" creationId="{CDF506B9-C160-48F9-A5C0-567B9B0245EA}"/>
+          </ac:spMkLst>
+        </pc:spChg>
+        <pc:spChg chg="mod">
+          <ac:chgData name="Sandra Klemet-N'guessan" userId="0d19dd2d-6e00-409e-9933-e191f280205d" providerId="ADAL" clId="{A5D23ACE-F9BA-49A9-BAD5-57D3CE328640}" dt="2022-11-18T13:34:15.104" v="68" actId="1076"/>
+          <ac:spMkLst>
+            <pc:docMk/>
+            <pc:sldMk cId="1778605326" sldId="257"/>
+            <ac:spMk id="67" creationId="{B176531F-0C1F-4AE8-821D-1C97209AEF42}"/>
+          </ac:spMkLst>
+        </pc:spChg>
+        <pc:spChg chg="mod">
+          <ac:chgData name="Sandra Klemet-N'guessan" userId="0d19dd2d-6e00-409e-9933-e191f280205d" providerId="ADAL" clId="{A5D23ACE-F9BA-49A9-BAD5-57D3CE328640}" dt="2022-11-18T13:34:15.104" v="68" actId="1076"/>
+          <ac:spMkLst>
+            <pc:docMk/>
+            <pc:sldMk cId="1778605326" sldId="257"/>
+            <ac:spMk id="68" creationId="{2AEF6073-AACA-40EA-BC16-A51A3FCEB76F}"/>
+          </ac:spMkLst>
+        </pc:spChg>
+        <pc:picChg chg="del mod">
+          <ac:chgData name="Sandra Klemet-N'guessan" userId="0d19dd2d-6e00-409e-9933-e191f280205d" providerId="ADAL" clId="{A5D23ACE-F9BA-49A9-BAD5-57D3CE328640}" dt="2022-11-18T13:36:32.504" v="82" actId="478"/>
+          <ac:picMkLst>
+            <pc:docMk/>
+            <pc:sldMk cId="1778605326" sldId="257"/>
+            <ac:picMk id="3" creationId="{CBA7F4BA-37E7-4BE9-A55F-2E67108E797B}"/>
+          </ac:picMkLst>
+        </pc:picChg>
+        <pc:picChg chg="add mod modCrop">
+          <ac:chgData name="Sandra Klemet-N'guessan" userId="0d19dd2d-6e00-409e-9933-e191f280205d" providerId="ADAL" clId="{A5D23ACE-F9BA-49A9-BAD5-57D3CE328640}" dt="2022-11-18T13:36:30.467" v="81" actId="1076"/>
+          <ac:picMkLst>
+            <pc:docMk/>
+            <pc:sldMk cId="1778605326" sldId="257"/>
+            <ac:picMk id="5" creationId="{B61F5EB7-57AC-2A9A-0058-BE8DF8FA2893}"/>
+          </ac:picMkLst>
+        </pc:picChg>
+        <pc:picChg chg="add del mod">
+          <ac:chgData name="Sandra Klemet-N'guessan" userId="0d19dd2d-6e00-409e-9933-e191f280205d" providerId="ADAL" clId="{A5D23ACE-F9BA-49A9-BAD5-57D3CE328640}" dt="2022-11-18T13:32:07.194" v="49" actId="478"/>
+          <ac:picMkLst>
+            <pc:docMk/>
+            <pc:sldMk cId="1778605326" sldId="257"/>
+            <ac:picMk id="7" creationId="{2A75A86E-0744-CD26-E9D5-A5954AB7E608}"/>
+          </ac:picMkLst>
+        </pc:picChg>
+        <pc:picChg chg="add mod">
+          <ac:chgData name="Sandra Klemet-N'guessan" userId="0d19dd2d-6e00-409e-9933-e191f280205d" providerId="ADAL" clId="{A5D23ACE-F9BA-49A9-BAD5-57D3CE328640}" dt="2022-11-18T13:36:43.682" v="83" actId="1076"/>
+          <ac:picMkLst>
+            <pc:docMk/>
+            <pc:sldMk cId="1778605326" sldId="257"/>
+            <ac:picMk id="8" creationId="{870E8BE2-6786-C11A-C49D-E2C1FF4F895C}"/>
+          </ac:picMkLst>
+        </pc:picChg>
+        <pc:picChg chg="del">
+          <ac:chgData name="Sandra Klemet-N'guessan" userId="0d19dd2d-6e00-409e-9933-e191f280205d" providerId="ADAL" clId="{A5D23ACE-F9BA-49A9-BAD5-57D3CE328640}" dt="2022-11-18T13:32:26.699" v="55" actId="478"/>
+          <ac:picMkLst>
+            <pc:docMk/>
+            <pc:sldMk cId="1778605326" sldId="257"/>
+            <ac:picMk id="65" creationId="{8F97ACD0-15E4-43C4-BE6F-28F7F9B1CA67}"/>
+          </ac:picMkLst>
+        </pc:picChg>
+      </pc:sldChg>
+    </pc:docChg>
+  </pc:docChgLst>
+</pc:chgInfo>
+</file>
+
 <file path=ppt/slideLayouts/slideLayout1.xml><?xml version="1.0" encoding="utf-8"?>
 <p:sldLayout xmlns:a="http://schemas.openxmlformats.org/drawingml/2006/main" xmlns:r="http://schemas.openxmlformats.org/officeDocument/2006/relationships" xmlns:p="http://schemas.openxmlformats.org/presentationml/2006/main" type="title" preserve="1">
   <p:cSld name="Title Slide">
@@ -263,7 +468,7 @@
           <a:p>
             <a:fld id="{BCB0F96B-91F1-424C-AA1F-3F0943DBBE38}" type="datetimeFigureOut">
               <a:rPr lang="en-CA" smtClean="0"/>
-              <a:t>2022-05-14</a:t>
+              <a:t>2022-11-17</a:t>
             </a:fld>
             <a:endParaRPr lang="en-CA"/>
           </a:p>
@@ -463,7 +668,7 @@
           <a:p>
             <a:fld id="{BCB0F96B-91F1-424C-AA1F-3F0943DBBE38}" type="datetimeFigureOut">
               <a:rPr lang="en-CA" smtClean="0"/>
-              <a:t>2022-05-14</a:t>
+              <a:t>2022-11-17</a:t>
             </a:fld>
             <a:endParaRPr lang="en-CA"/>
           </a:p>
@@ -673,7 +878,7 @@
           <a:p>
             <a:fld id="{BCB0F96B-91F1-424C-AA1F-3F0943DBBE38}" type="datetimeFigureOut">
               <a:rPr lang="en-CA" smtClean="0"/>
-              <a:t>2022-05-14</a:t>
+              <a:t>2022-11-17</a:t>
             </a:fld>
             <a:endParaRPr lang="en-CA"/>
           </a:p>
@@ -873,7 +1078,7 @@
           <a:p>
             <a:fld id="{BCB0F96B-91F1-424C-AA1F-3F0943DBBE38}" type="datetimeFigureOut">
               <a:rPr lang="en-CA" smtClean="0"/>
-              <a:t>2022-05-14</a:t>
+              <a:t>2022-11-17</a:t>
             </a:fld>
             <a:endParaRPr lang="en-CA"/>
           </a:p>
@@ -1149,7 +1354,7 @@
           <a:p>
             <a:fld id="{BCB0F96B-91F1-424C-AA1F-3F0943DBBE38}" type="datetimeFigureOut">
               <a:rPr lang="en-CA" smtClean="0"/>
-              <a:t>2022-05-14</a:t>
+              <a:t>2022-11-17</a:t>
             </a:fld>
             <a:endParaRPr lang="en-CA"/>
           </a:p>
@@ -1417,7 +1622,7 @@
           <a:p>
             <a:fld id="{BCB0F96B-91F1-424C-AA1F-3F0943DBBE38}" type="datetimeFigureOut">
               <a:rPr lang="en-CA" smtClean="0"/>
-              <a:t>2022-05-14</a:t>
+              <a:t>2022-11-17</a:t>
             </a:fld>
             <a:endParaRPr lang="en-CA"/>
           </a:p>
@@ -1832,7 +2037,7 @@
           <a:p>
             <a:fld id="{BCB0F96B-91F1-424C-AA1F-3F0943DBBE38}" type="datetimeFigureOut">
               <a:rPr lang="en-CA" smtClean="0"/>
-              <a:t>2022-05-14</a:t>
+              <a:t>2022-11-17</a:t>
             </a:fld>
             <a:endParaRPr lang="en-CA"/>
           </a:p>
@@ -1974,7 +2179,7 @@
           <a:p>
             <a:fld id="{BCB0F96B-91F1-424C-AA1F-3F0943DBBE38}" type="datetimeFigureOut">
               <a:rPr lang="en-CA" smtClean="0"/>
-              <a:t>2022-05-14</a:t>
+              <a:t>2022-11-17</a:t>
             </a:fld>
             <a:endParaRPr lang="en-CA"/>
           </a:p>
@@ -2087,7 +2292,7 @@
           <a:p>
             <a:fld id="{BCB0F96B-91F1-424C-AA1F-3F0943DBBE38}" type="datetimeFigureOut">
               <a:rPr lang="en-CA" smtClean="0"/>
-              <a:t>2022-05-14</a:t>
+              <a:t>2022-11-17</a:t>
             </a:fld>
             <a:endParaRPr lang="en-CA"/>
           </a:p>
@@ -2400,7 +2605,7 @@
           <a:p>
             <a:fld id="{BCB0F96B-91F1-424C-AA1F-3F0943DBBE38}" type="datetimeFigureOut">
               <a:rPr lang="en-CA" smtClean="0"/>
-              <a:t>2022-05-14</a:t>
+              <a:t>2022-11-17</a:t>
             </a:fld>
             <a:endParaRPr lang="en-CA"/>
           </a:p>
@@ -2689,7 +2894,7 @@
           <a:p>
             <a:fld id="{BCB0F96B-91F1-424C-AA1F-3F0943DBBE38}" type="datetimeFigureOut">
               <a:rPr lang="en-CA" smtClean="0"/>
-              <a:t>2022-05-14</a:t>
+              <a:t>2022-11-17</a:t>
             </a:fld>
             <a:endParaRPr lang="en-CA"/>
           </a:p>
@@ -2932,7 +3137,7 @@
           <a:p>
             <a:fld id="{BCB0F96B-91F1-424C-AA1F-3F0943DBBE38}" type="datetimeFigureOut">
               <a:rPr lang="en-CA" smtClean="0"/>
-              <a:t>2022-05-14</a:t>
+              <a:t>2022-11-17</a:t>
             </a:fld>
             <a:endParaRPr lang="en-CA"/>
           </a:p>
@@ -3550,75 +3755,6 @@
           <a:chExt cx="0" cy="0"/>
         </a:xfrm>
       </p:grpSpPr>
-      <p:pic>
-        <p:nvPicPr>
-          <p:cNvPr id="3" name="Picture 2" descr="A picture containing fish, soft-finned fish&#10;&#10;Description automatically generated">
-            <a:extLst>
-              <a:ext uri="{FF2B5EF4-FFF2-40B4-BE49-F238E27FC236}">
-                <a16:creationId xmlns:a16="http://schemas.microsoft.com/office/drawing/2014/main" id="{CBA7F4BA-37E7-4BE9-A55F-2E67108E797B}"/>
-              </a:ext>
-            </a:extLst>
-          </p:cNvPr>
-          <p:cNvPicPr>
-            <a:picLocks noChangeAspect="1"/>
-          </p:cNvPicPr>
-          <p:nvPr/>
-        </p:nvPicPr>
-        <p:blipFill>
-          <a:blip r:embed="rId3">
-            <a:extLst>
-              <a:ext uri="{BEBA8EAE-BF5A-486C-A8C5-ECC9F3942E4B}">
-                <a14:imgProps xmlns:a14="http://schemas.microsoft.com/office/drawing/2010/main">
-                  <a14:imgLayer r:embed="rId4">
-                    <a14:imgEffect>
-                      <a14:backgroundRemoval t="9810" b="89898" l="5176" r="94141">
-                        <a14:foregroundMark x1="7715" y1="49048" x2="14844" y2="31918"/>
-                        <a14:foregroundMark x1="14844" y1="31918" x2="14844" y2="31918"/>
-                        <a14:foregroundMark x1="5176" y1="46266" x2="5176" y2="53148"/>
-                        <a14:foregroundMark x1="89844" y1="52123" x2="91016" y2="62372"/>
-                        <a14:foregroundMark x1="89746" y1="60908" x2="89746" y2="60908"/>
-                        <a14:foregroundMark x1="94141" y1="62372" x2="93945" y2="60908"/>
-                        <a14:foregroundMark x1="26367" y1="31186" x2="26270" y2="28843"/>
-                        <a14:foregroundMark x1="35156" y1="24451" x2="35156" y2="24451"/>
-                        <a14:foregroundMark x1="31250" y1="23133" x2="31348" y2="20351"/>
-                        <a14:foregroundMark x1="25977" y1="29136" x2="25098" y2="30600"/>
-                        <a14:foregroundMark x1="28418" y1="31918" x2="26172" y2="30747"/>
-                        <a14:foregroundMark x1="21777" y1="31918" x2="21777" y2="31918"/>
-                        <a14:foregroundMark x1="25684" y1="31332" x2="23828" y2="27818"/>
-                        <a14:foregroundMark x1="27344" y1="48463" x2="27832" y2="63104"/>
-                        <a14:foregroundMark x1="27832" y1="63104" x2="28906" y2="63836"/>
-                        <a14:foregroundMark x1="26758" y1="49780" x2="27441" y2="63543"/>
-                        <a14:foregroundMark x1="27441" y1="63543" x2="27832" y2="63690"/>
-                        <a14:foregroundMark x1="26172" y1="51391" x2="26172" y2="59590"/>
-                        <a14:foregroundMark x1="26465" y1="59004" x2="25586" y2="48755"/>
-                        <a14:foregroundMark x1="24219" y1="49927" x2="25879" y2="59883"/>
-                      </a14:backgroundRemoval>
-                    </a14:imgEffect>
-                  </a14:imgLayer>
-                </a14:imgProps>
-              </a:ext>
-              <a:ext uri="{28A0092B-C50C-407E-A947-70E740481C1C}">
-                <a14:useLocalDpi xmlns:a14="http://schemas.microsoft.com/office/drawing/2010/main" val="0"/>
-              </a:ext>
-              <a:ext uri="{837473B0-CC2E-450A-ABE3-18F120FF3D39}">
-                <a1611:picAttrSrcUrl xmlns:a1611="http://schemas.microsoft.com/office/drawing/2016/11/main" r:id="rId5"/>
-              </a:ext>
-            </a:extLst>
-          </a:blip>
-          <a:stretch>
-            <a:fillRect/>
-          </a:stretch>
-        </p:blipFill>
-        <p:spPr>
-          <a:xfrm>
-            <a:off x="2086550" y="-2419"/>
-            <a:ext cx="5155686" cy="3438802"/>
-          </a:xfrm>
-          <a:prstGeom prst="rect">
-            <a:avLst/>
-          </a:prstGeom>
-        </p:spPr>
-      </p:pic>
       <p:cxnSp>
         <p:nvCxnSpPr>
           <p:cNvPr id="29" name="Straight Connector 28">
@@ -3735,7 +3871,7 @@
         </p:nvSpPr>
         <p:spPr>
           <a:xfrm rot="5400000">
-            <a:off x="2190220" y="1427212"/>
+            <a:off x="3460154" y="1923303"/>
             <a:ext cx="504940" cy="1238580"/>
           </a:xfrm>
           <a:prstGeom prst="curvedConnector2">
@@ -3793,7 +3929,7 @@
         </p:nvSpPr>
         <p:spPr>
           <a:xfrm>
-            <a:off x="1096557" y="2000347"/>
+            <a:off x="2366491" y="2496438"/>
             <a:ext cx="532930" cy="646331"/>
           </a:xfrm>
           <a:prstGeom prst="rect">
@@ -3820,75 +3956,6 @@
           </a:p>
         </p:txBody>
       </p:sp>
-      <p:pic>
-        <p:nvPicPr>
-          <p:cNvPr id="65" name="Picture 64" descr="A picture containing fish, soft-finned fish&#10;&#10;Description automatically generated">
-            <a:extLst>
-              <a:ext uri="{FF2B5EF4-FFF2-40B4-BE49-F238E27FC236}">
-                <a16:creationId xmlns:a16="http://schemas.microsoft.com/office/drawing/2014/main" id="{8F97ACD0-15E4-43C4-BE6F-28F7F9B1CA67}"/>
-              </a:ext>
-            </a:extLst>
-          </p:cNvPr>
-          <p:cNvPicPr>
-            <a:picLocks noChangeAspect="1"/>
-          </p:cNvPicPr>
-          <p:nvPr/>
-        </p:nvPicPr>
-        <p:blipFill>
-          <a:blip r:embed="rId3">
-            <a:extLst>
-              <a:ext uri="{BEBA8EAE-BF5A-486C-A8C5-ECC9F3942E4B}">
-                <a14:imgProps xmlns:a14="http://schemas.microsoft.com/office/drawing/2010/main">
-                  <a14:imgLayer r:embed="rId4">
-                    <a14:imgEffect>
-                      <a14:backgroundRemoval t="9810" b="89898" l="5176" r="94141">
-                        <a14:foregroundMark x1="7715" y1="49048" x2="14844" y2="31918"/>
-                        <a14:foregroundMark x1="14844" y1="31918" x2="14844" y2="31918"/>
-                        <a14:foregroundMark x1="5176" y1="46266" x2="5176" y2="53148"/>
-                        <a14:foregroundMark x1="89844" y1="52123" x2="91016" y2="62372"/>
-                        <a14:foregroundMark x1="89746" y1="60908" x2="89746" y2="60908"/>
-                        <a14:foregroundMark x1="94141" y1="62372" x2="93945" y2="60908"/>
-                        <a14:foregroundMark x1="26367" y1="31186" x2="26270" y2="28843"/>
-                        <a14:foregroundMark x1="35156" y1="24451" x2="35156" y2="24451"/>
-                        <a14:foregroundMark x1="31250" y1="23133" x2="31348" y2="20351"/>
-                        <a14:foregroundMark x1="25977" y1="29136" x2="25098" y2="30600"/>
-                        <a14:foregroundMark x1="28418" y1="31918" x2="26172" y2="30747"/>
-                        <a14:foregroundMark x1="21777" y1="31918" x2="21777" y2="31918"/>
-                        <a14:foregroundMark x1="25684" y1="31332" x2="23828" y2="27818"/>
-                        <a14:foregroundMark x1="27344" y1="48463" x2="27832" y2="63104"/>
-                        <a14:foregroundMark x1="27832" y1="63104" x2="28906" y2="63836"/>
-                        <a14:foregroundMark x1="26758" y1="49780" x2="27441" y2="63543"/>
-                        <a14:foregroundMark x1="27441" y1="63543" x2="27832" y2="63690"/>
-                        <a14:foregroundMark x1="26172" y1="51391" x2="26172" y2="59590"/>
-                        <a14:foregroundMark x1="26465" y1="59004" x2="25586" y2="48755"/>
-                        <a14:foregroundMark x1="24219" y1="49927" x2="25879" y2="59883"/>
-                      </a14:backgroundRemoval>
-                    </a14:imgEffect>
-                  </a14:imgLayer>
-                </a14:imgProps>
-              </a:ext>
-              <a:ext uri="{28A0092B-C50C-407E-A947-70E740481C1C}">
-                <a14:useLocalDpi xmlns:a14="http://schemas.microsoft.com/office/drawing/2010/main" val="0"/>
-              </a:ext>
-              <a:ext uri="{837473B0-CC2E-450A-ABE3-18F120FF3D39}">
-                <a1611:picAttrSrcUrl xmlns:a1611="http://schemas.microsoft.com/office/drawing/2016/11/main" r:id="rId5"/>
-              </a:ext>
-            </a:extLst>
-          </a:blip>
-          <a:stretch>
-            <a:fillRect/>
-          </a:stretch>
-        </p:blipFill>
-        <p:spPr>
-          <a:xfrm>
-            <a:off x="6533439" y="3590112"/>
-            <a:ext cx="3688080" cy="2459921"/>
-          </a:xfrm>
-          <a:prstGeom prst="rect">
-            <a:avLst/>
-          </a:prstGeom>
-        </p:spPr>
-      </p:pic>
       <p:sp>
         <p:nvSpPr>
           <p:cNvPr id="66" name="Conector: curvado 15">
@@ -3903,7 +3970,7 @@
         </p:nvSpPr>
         <p:spPr>
           <a:xfrm rot="5400000">
-            <a:off x="6434432" y="4623246"/>
+            <a:off x="8377539" y="4479177"/>
             <a:ext cx="307243" cy="1047891"/>
           </a:xfrm>
           <a:prstGeom prst="curvedConnector2">
@@ -3961,7 +4028,7 @@
         </p:nvSpPr>
         <p:spPr>
           <a:xfrm>
-            <a:off x="8286456" y="5690033"/>
+            <a:off x="10229563" y="5545964"/>
             <a:ext cx="894329" cy="646331"/>
           </a:xfrm>
           <a:prstGeom prst="rect">
@@ -4002,7 +4069,7 @@
         </p:nvSpPr>
         <p:spPr>
           <a:xfrm>
-            <a:off x="5165043" y="4973164"/>
+            <a:off x="7108150" y="4829095"/>
             <a:ext cx="796083" cy="646331"/>
           </a:xfrm>
           <a:prstGeom prst="rect">
@@ -4044,7 +4111,7 @@
         </p:nvSpPr>
         <p:spPr>
           <a:xfrm rot="5400000">
-            <a:off x="2169126" y="2138488"/>
+            <a:off x="3439060" y="2634579"/>
             <a:ext cx="1209039" cy="720001"/>
           </a:xfrm>
           <a:prstGeom prst="curvedConnector2">
@@ -4102,7 +4169,7 @@
         </p:nvSpPr>
         <p:spPr>
           <a:xfrm>
-            <a:off x="1590584" y="2799756"/>
+            <a:off x="2860518" y="3295847"/>
             <a:ext cx="720000" cy="646331"/>
           </a:xfrm>
           <a:prstGeom prst="rect">
@@ -4143,7 +4210,7 @@
         </p:nvSpPr>
         <p:spPr>
           <a:xfrm rot="5400000">
-            <a:off x="6288790" y="5284798"/>
+            <a:off x="8231897" y="5140729"/>
             <a:ext cx="1198094" cy="708797"/>
           </a:xfrm>
           <a:prstGeom prst="curvedConnector2">
@@ -4201,7 +4268,7 @@
         </p:nvSpPr>
         <p:spPr>
           <a:xfrm>
-            <a:off x="5710805" y="5932212"/>
+            <a:off x="7653912" y="5788143"/>
             <a:ext cx="532930" cy="646331"/>
           </a:xfrm>
           <a:prstGeom prst="rect">
@@ -4242,7 +4309,7 @@
         </p:nvSpPr>
         <p:spPr>
           <a:xfrm rot="5400000" flipV="1">
-            <a:off x="7270306" y="5175597"/>
+            <a:off x="9213413" y="5031528"/>
             <a:ext cx="963302" cy="744470"/>
           </a:xfrm>
           <a:prstGeom prst="curvedConnector2">
@@ -4300,7 +4367,7 @@
         </p:nvSpPr>
         <p:spPr>
           <a:xfrm>
-            <a:off x="887734" y="1963869"/>
+            <a:off x="2157668" y="2459960"/>
             <a:ext cx="864000" cy="720000"/>
           </a:xfrm>
           <a:prstGeom prst="hexagon">
@@ -4354,7 +4421,7 @@
         </p:nvSpPr>
         <p:spPr>
           <a:xfrm>
-            <a:off x="1405480" y="2771071"/>
+            <a:off x="2675414" y="3267162"/>
             <a:ext cx="864000" cy="720000"/>
           </a:xfrm>
           <a:prstGeom prst="hexagon">
@@ -4408,7 +4475,7 @@
         </p:nvSpPr>
         <p:spPr>
           <a:xfrm>
-            <a:off x="5112199" y="4932756"/>
+            <a:off x="7055306" y="4788687"/>
             <a:ext cx="864000" cy="720000"/>
           </a:xfrm>
           <a:prstGeom prst="hexagon">
@@ -4462,7 +4529,7 @@
         </p:nvSpPr>
         <p:spPr>
           <a:xfrm>
-            <a:off x="5548199" y="5895378"/>
+            <a:off x="7491306" y="5751309"/>
             <a:ext cx="864000" cy="720000"/>
           </a:xfrm>
           <a:prstGeom prst="hexagon">
@@ -4516,7 +4583,7 @@
         </p:nvSpPr>
         <p:spPr>
           <a:xfrm>
-            <a:off x="8245433" y="5690033"/>
+            <a:off x="10188540" y="5545964"/>
             <a:ext cx="864000" cy="720000"/>
           </a:xfrm>
           <a:prstGeom prst="hexagon">
@@ -4570,7 +4637,7 @@
         </p:nvSpPr>
         <p:spPr>
           <a:xfrm>
-            <a:off x="4161146" y="4977647"/>
+            <a:off x="6104253" y="4833578"/>
             <a:ext cx="796083" cy="646331"/>
           </a:xfrm>
           <a:prstGeom prst="rect">
@@ -4612,7 +4679,7 @@
         </p:nvSpPr>
         <p:spPr>
           <a:xfrm>
-            <a:off x="4108302" y="4937239"/>
+            <a:off x="6051409" y="4793170"/>
             <a:ext cx="864000" cy="720000"/>
           </a:xfrm>
           <a:prstGeom prst="hexagon">
@@ -4652,6 +4719,163 @@
           </a:p>
         </p:txBody>
       </p:sp>
+      <p:pic>
+        <p:nvPicPr>
+          <p:cNvPr id="5" name="Picture 4" descr="A person holding a fish&#10;&#10;Description automatically generated">
+            <a:extLst>
+              <a:ext uri="{FF2B5EF4-FFF2-40B4-BE49-F238E27FC236}">
+                <a16:creationId xmlns:a16="http://schemas.microsoft.com/office/drawing/2014/main" id="{B61F5EB7-57AC-2A9A-0058-BE8DF8FA2893}"/>
+              </a:ext>
+            </a:extLst>
+          </p:cNvPr>
+          <p:cNvPicPr>
+            <a:picLocks noChangeAspect="1"/>
+          </p:cNvPicPr>
+          <p:nvPr/>
+        </p:nvPicPr>
+        <p:blipFill rotWithShape="1">
+          <a:blip r:embed="rId3">
+            <a:extLst>
+              <a:ext uri="{BEBA8EAE-BF5A-486C-A8C5-ECC9F3942E4B}">
+                <a14:imgProps xmlns:a14="http://schemas.microsoft.com/office/drawing/2010/main">
+                  <a14:imgLayer r:embed="rId4">
+                    <a14:imgEffect>
+                      <a14:backgroundRemoval t="5420" b="95117" l="9961" r="89974">
+                        <a14:foregroundMark x1="59563" y1="22820" x2="23828" y2="68262"/>
+                        <a14:foregroundMark x1="62956" y1="18506" x2="61016" y2="20973"/>
+                        <a14:foregroundMark x1="23828" y1="68262" x2="23568" y2="93311"/>
+                        <a14:foregroundMark x1="63281" y1="14502" x2="63409" y2="13184"/>
+                        <a14:foregroundMark x1="73230" y1="7944" x2="73958" y2="8008"/>
+                        <a14:foregroundMark x1="64682" y1="7189" x2="70972" y2="7744"/>
+                        <a14:foregroundMark x1="73958" y1="8008" x2="75651" y2="15723"/>
+                        <a14:foregroundMark x1="64974" y1="6201" x2="69727" y2="5420"/>
+                        <a14:foregroundMark x1="76628" y1="7910" x2="78451" y2="11133"/>
+                        <a14:foregroundMark x1="78581" y1="7568" x2="79362" y2="9668"/>
+                        <a14:foregroundMark x1="55143" y1="28027" x2="46940" y2="34570"/>
+                        <a14:foregroundMark x1="46940" y1="34570" x2="45508" y2="37451"/>
+                        <a14:foregroundMark x1="65885" y1="32520" x2="62500" y2="46191"/>
+                        <a14:foregroundMark x1="65885" y1="32080" x2="67122" y2="35840"/>
+                        <a14:foregroundMark x1="67448" y1="31592" x2="68620" y2="35303"/>
+                        <a14:foregroundMark x1="66797" y1="27002" x2="66667" y2="28271"/>
+                        <a14:foregroundMark x1="67578" y1="25732" x2="67578" y2="26221"/>
+                        <a14:foregroundMark x1="27409" y1="95117" x2="31706" y2="91748"/>
+                        <a14:backgroundMark x1="37826" y1="45996" x2="44271" y2="35400"/>
+                        <a14:backgroundMark x1="36784" y1="26904" x2="56576" y2="14063"/>
+                        <a14:backgroundMark x1="56576" y1="14063" x2="55924" y2="24023"/>
+                        <a14:backgroundMark x1="55924" y1="24023" x2="47005" y2="30176"/>
+                        <a14:backgroundMark x1="47005" y1="30176" x2="45378" y2="34033"/>
+                        <a14:backgroundMark x1="60221" y1="20898" x2="59896" y2="22852"/>
+                        <a14:backgroundMark x1="80013" y1="14844" x2="80512" y2="9433"/>
+                        <a14:backgroundMark x1="75977" y1="15625" x2="72201" y2="18750"/>
+                        <a14:backgroundMark x1="74349" y1="6201" x2="75521" y2="6445"/>
+                        <a14:backgroundMark x1="69713" y1="5437" x2="73568" y2="7715"/>
+                        <a14:backgroundMark x1="74349" y1="7715" x2="74349" y2="7715"/>
+                        <a14:backgroundMark x1="68359" y1="27686" x2="70052" y2="33447"/>
+                        <a14:backgroundMark x1="65755" y1="45313" x2="62500" y2="61133"/>
+                        <a14:backgroundMark x1="62500" y1="61133" x2="49284" y2="77441"/>
+                        <a14:backgroundMark x1="63021" y1="6396" x2="63021" y2="13184"/>
+                      </a14:backgroundRemoval>
+                    </a14:imgEffect>
+                  </a14:imgLayer>
+                </a14:imgProps>
+              </a:ext>
+              <a:ext uri="{28A0092B-C50C-407E-A947-70E740481C1C}">
+                <a14:useLocalDpi xmlns:a14="http://schemas.microsoft.com/office/drawing/2010/main" val="0"/>
+              </a:ext>
+            </a:extLst>
+          </a:blip>
+          <a:srcRect l="19640" r="16672"/>
+          <a:stretch/>
+        </p:blipFill>
+        <p:spPr>
+          <a:xfrm rot="4133417">
+            <a:off x="2993058" y="-1779686"/>
+            <a:ext cx="3275733" cy="6858000"/>
+          </a:xfrm>
+          <a:prstGeom prst="rect">
+            <a:avLst/>
+          </a:prstGeom>
+        </p:spPr>
+      </p:pic>
+      <p:pic>
+        <p:nvPicPr>
+          <p:cNvPr id="8" name="Picture 7" descr="A person holding a fish&#10;&#10;Description automatically generated">
+            <a:extLst>
+              <a:ext uri="{FF2B5EF4-FFF2-40B4-BE49-F238E27FC236}">
+                <a16:creationId xmlns:a16="http://schemas.microsoft.com/office/drawing/2014/main" id="{870E8BE2-6786-C11A-C49D-E2C1FF4F895C}"/>
+              </a:ext>
+            </a:extLst>
+          </p:cNvPr>
+          <p:cNvPicPr>
+            <a:picLocks noChangeAspect="1"/>
+          </p:cNvPicPr>
+          <p:nvPr/>
+        </p:nvPicPr>
+        <p:blipFill>
+          <a:blip r:embed="rId3">
+            <a:extLst>
+              <a:ext uri="{BEBA8EAE-BF5A-486C-A8C5-ECC9F3942E4B}">
+                <a14:imgProps xmlns:a14="http://schemas.microsoft.com/office/drawing/2010/main">
+                  <a14:imgLayer r:embed="rId4">
+                    <a14:imgEffect>
+                      <a14:backgroundRemoval t="5420" b="95117" l="9961" r="89974">
+                        <a14:foregroundMark x1="59563" y1="22820" x2="23828" y2="68262"/>
+                        <a14:foregroundMark x1="62956" y1="18506" x2="61016" y2="20973"/>
+                        <a14:foregroundMark x1="23828" y1="68262" x2="23568" y2="93311"/>
+                        <a14:foregroundMark x1="63281" y1="14502" x2="63409" y2="13184"/>
+                        <a14:foregroundMark x1="73230" y1="7944" x2="73958" y2="8008"/>
+                        <a14:foregroundMark x1="64682" y1="7189" x2="70972" y2="7744"/>
+                        <a14:foregroundMark x1="73958" y1="8008" x2="75651" y2="15723"/>
+                        <a14:foregroundMark x1="64974" y1="6201" x2="69727" y2="5420"/>
+                        <a14:foregroundMark x1="76628" y1="7910" x2="78451" y2="11133"/>
+                        <a14:foregroundMark x1="78581" y1="7568" x2="79362" y2="9668"/>
+                        <a14:foregroundMark x1="55143" y1="28027" x2="46940" y2="34570"/>
+                        <a14:foregroundMark x1="46940" y1="34570" x2="45508" y2="37451"/>
+                        <a14:foregroundMark x1="65885" y1="32520" x2="62500" y2="46191"/>
+                        <a14:foregroundMark x1="65885" y1="32080" x2="67122" y2="35840"/>
+                        <a14:foregroundMark x1="67448" y1="31592" x2="68620" y2="35303"/>
+                        <a14:foregroundMark x1="66797" y1="27002" x2="66667" y2="28271"/>
+                        <a14:foregroundMark x1="67578" y1="25732" x2="67578" y2="26221"/>
+                        <a14:foregroundMark x1="27409" y1="95117" x2="31706" y2="91748"/>
+                        <a14:backgroundMark x1="37826" y1="45996" x2="44271" y2="35400"/>
+                        <a14:backgroundMark x1="36784" y1="26904" x2="56576" y2="14063"/>
+                        <a14:backgroundMark x1="56576" y1="14063" x2="55924" y2="24023"/>
+                        <a14:backgroundMark x1="55924" y1="24023" x2="47005" y2="30176"/>
+                        <a14:backgroundMark x1="47005" y1="30176" x2="45378" y2="34033"/>
+                        <a14:backgroundMark x1="60221" y1="20898" x2="59896" y2="22852"/>
+                        <a14:backgroundMark x1="80013" y1="14844" x2="80512" y2="9433"/>
+                        <a14:backgroundMark x1="75977" y1="15625" x2="72201" y2="18750"/>
+                        <a14:backgroundMark x1="74349" y1="6201" x2="75521" y2="6445"/>
+                        <a14:backgroundMark x1="69713" y1="5437" x2="73568" y2="7715"/>
+                        <a14:backgroundMark x1="74349" y1="7715" x2="74349" y2="7715"/>
+                        <a14:backgroundMark x1="68359" y1="27686" x2="70052" y2="33447"/>
+                        <a14:backgroundMark x1="65755" y1="45313" x2="62500" y2="61133"/>
+                        <a14:backgroundMark x1="62500" y1="61133" x2="49284" y2="77441"/>
+                        <a14:backgroundMark x1="63021" y1="6396" x2="63021" y2="13184"/>
+                      </a14:backgroundRemoval>
+                    </a14:imgEffect>
+                  </a14:imgLayer>
+                </a14:imgProps>
+              </a:ext>
+              <a:ext uri="{28A0092B-C50C-407E-A947-70E740481C1C}">
+                <a14:useLocalDpi xmlns:a14="http://schemas.microsoft.com/office/drawing/2010/main" val="0"/>
+              </a:ext>
+            </a:extLst>
+          </a:blip>
+          <a:stretch>
+            <a:fillRect/>
+          </a:stretch>
+        </p:blipFill>
+        <p:spPr>
+          <a:xfrm rot="4133417">
+            <a:off x="7394534" y="1710999"/>
+            <a:ext cx="3856590" cy="5142120"/>
+          </a:xfrm>
+          <a:prstGeom prst="rect">
+            <a:avLst/>
+          </a:prstGeom>
+        </p:spPr>
+      </p:pic>
     </p:spTree>
     <p:extLst>
       <p:ext uri="{BB962C8B-B14F-4D97-AF65-F5344CB8AC3E}">

</xml_diff>

<commit_message>
changed figures and tested analyses for ms revisions
</commit_message>
<xml_diff>
--- a/figures/preliminary-figures/TOC.pptx
+++ b/figures/preliminary-figures/TOC.pptx
@@ -127,12 +127,12 @@
   <pc:docChgLst>
     <pc:chgData name="Sandra Klemet-N'guessan" userId="0d19dd2d-6e00-409e-9933-e191f280205d" providerId="ADAL" clId="{A5D23ACE-F9BA-49A9-BAD5-57D3CE328640}"/>
     <pc:docChg chg="undo custSel modSld">
-      <pc:chgData name="Sandra Klemet-N'guessan" userId="0d19dd2d-6e00-409e-9933-e191f280205d" providerId="ADAL" clId="{A5D23ACE-F9BA-49A9-BAD5-57D3CE328640}" dt="2022-11-18T13:36:43.682" v="83" actId="1076"/>
+      <pc:chgData name="Sandra Klemet-N'guessan" userId="0d19dd2d-6e00-409e-9933-e191f280205d" providerId="ADAL" clId="{A5D23ACE-F9BA-49A9-BAD5-57D3CE328640}" dt="2022-11-22T02:04:35.818" v="96" actId="1076"/>
       <pc:docMkLst>
         <pc:docMk/>
       </pc:docMkLst>
       <pc:sldChg chg="addSp delSp modSp mod">
-        <pc:chgData name="Sandra Klemet-N'guessan" userId="0d19dd2d-6e00-409e-9933-e191f280205d" providerId="ADAL" clId="{A5D23ACE-F9BA-49A9-BAD5-57D3CE328640}" dt="2022-11-18T13:36:43.682" v="83" actId="1076"/>
+        <pc:chgData name="Sandra Klemet-N'guessan" userId="0d19dd2d-6e00-409e-9933-e191f280205d" providerId="ADAL" clId="{A5D23ACE-F9BA-49A9-BAD5-57D3CE328640}" dt="2022-11-22T02:04:35.818" v="96" actId="1076"/>
         <pc:sldMkLst>
           <pc:docMk/>
           <pc:sldMk cId="1778605326" sldId="257"/>
@@ -162,7 +162,7 @@
           </ac:spMkLst>
         </pc:spChg>
         <pc:spChg chg="mod">
-          <ac:chgData name="Sandra Klemet-N'guessan" userId="0d19dd2d-6e00-409e-9933-e191f280205d" providerId="ADAL" clId="{A5D23ACE-F9BA-49A9-BAD5-57D3CE328640}" dt="2022-11-18T13:34:15.104" v="68" actId="1076"/>
+          <ac:chgData name="Sandra Klemet-N'guessan" userId="0d19dd2d-6e00-409e-9933-e191f280205d" providerId="ADAL" clId="{A5D23ACE-F9BA-49A9-BAD5-57D3CE328640}" dt="2022-11-22T02:04:30.549" v="95" actId="1076"/>
           <ac:spMkLst>
             <pc:docMk/>
             <pc:sldMk cId="1778605326" sldId="257"/>
@@ -178,7 +178,7 @@
           </ac:spMkLst>
         </pc:spChg>
         <pc:spChg chg="mod">
-          <ac:chgData name="Sandra Klemet-N'guessan" userId="0d19dd2d-6e00-409e-9933-e191f280205d" providerId="ADAL" clId="{A5D23ACE-F9BA-49A9-BAD5-57D3CE328640}" dt="2022-11-18T13:34:15.104" v="68" actId="1076"/>
+          <ac:chgData name="Sandra Klemet-N'guessan" userId="0d19dd2d-6e00-409e-9933-e191f280205d" providerId="ADAL" clId="{A5D23ACE-F9BA-49A9-BAD5-57D3CE328640}" dt="2022-11-22T02:04:30.549" v="95" actId="1076"/>
           <ac:spMkLst>
             <pc:docMk/>
             <pc:sldMk cId="1778605326" sldId="257"/>
@@ -186,7 +186,7 @@
           </ac:spMkLst>
         </pc:spChg>
         <pc:spChg chg="mod">
-          <ac:chgData name="Sandra Klemet-N'guessan" userId="0d19dd2d-6e00-409e-9933-e191f280205d" providerId="ADAL" clId="{A5D23ACE-F9BA-49A9-BAD5-57D3CE328640}" dt="2022-11-18T13:34:15.104" v="68" actId="1076"/>
+          <ac:chgData name="Sandra Klemet-N'guessan" userId="0d19dd2d-6e00-409e-9933-e191f280205d" providerId="ADAL" clId="{A5D23ACE-F9BA-49A9-BAD5-57D3CE328640}" dt="2022-11-22T02:04:30.549" v="95" actId="1076"/>
           <ac:spMkLst>
             <pc:docMk/>
             <pc:sldMk cId="1778605326" sldId="257"/>
@@ -202,7 +202,7 @@
           </ac:spMkLst>
         </pc:spChg>
         <pc:spChg chg="mod">
-          <ac:chgData name="Sandra Klemet-N'guessan" userId="0d19dd2d-6e00-409e-9933-e191f280205d" providerId="ADAL" clId="{A5D23ACE-F9BA-49A9-BAD5-57D3CE328640}" dt="2022-11-18T13:34:15.104" v="68" actId="1076"/>
+          <ac:chgData name="Sandra Klemet-N'guessan" userId="0d19dd2d-6e00-409e-9933-e191f280205d" providerId="ADAL" clId="{A5D23ACE-F9BA-49A9-BAD5-57D3CE328640}" dt="2022-11-22T02:04:30.549" v="95" actId="1076"/>
           <ac:spMkLst>
             <pc:docMk/>
             <pc:sldMk cId="1778605326" sldId="257"/>
@@ -210,7 +210,7 @@
           </ac:spMkLst>
         </pc:spChg>
         <pc:spChg chg="mod">
-          <ac:chgData name="Sandra Klemet-N'guessan" userId="0d19dd2d-6e00-409e-9933-e191f280205d" providerId="ADAL" clId="{A5D23ACE-F9BA-49A9-BAD5-57D3CE328640}" dt="2022-11-18T13:34:15.104" v="68" actId="1076"/>
+          <ac:chgData name="Sandra Klemet-N'guessan" userId="0d19dd2d-6e00-409e-9933-e191f280205d" providerId="ADAL" clId="{A5D23ACE-F9BA-49A9-BAD5-57D3CE328640}" dt="2022-11-22T02:04:30.549" v="95" actId="1076"/>
           <ac:spMkLst>
             <pc:docMk/>
             <pc:sldMk cId="1778605326" sldId="257"/>
@@ -218,7 +218,7 @@
           </ac:spMkLst>
         </pc:spChg>
         <pc:spChg chg="mod">
-          <ac:chgData name="Sandra Klemet-N'guessan" userId="0d19dd2d-6e00-409e-9933-e191f280205d" providerId="ADAL" clId="{A5D23ACE-F9BA-49A9-BAD5-57D3CE328640}" dt="2022-11-18T13:34:15.104" v="68" actId="1076"/>
+          <ac:chgData name="Sandra Klemet-N'guessan" userId="0d19dd2d-6e00-409e-9933-e191f280205d" providerId="ADAL" clId="{A5D23ACE-F9BA-49A9-BAD5-57D3CE328640}" dt="2022-11-22T02:04:30.549" v="95" actId="1076"/>
           <ac:spMkLst>
             <pc:docMk/>
             <pc:sldMk cId="1778605326" sldId="257"/>
@@ -226,7 +226,7 @@
           </ac:spMkLst>
         </pc:spChg>
         <pc:spChg chg="mod">
-          <ac:chgData name="Sandra Klemet-N'guessan" userId="0d19dd2d-6e00-409e-9933-e191f280205d" providerId="ADAL" clId="{A5D23ACE-F9BA-49A9-BAD5-57D3CE328640}" dt="2022-11-18T13:34:15.104" v="68" actId="1076"/>
+          <ac:chgData name="Sandra Klemet-N'guessan" userId="0d19dd2d-6e00-409e-9933-e191f280205d" providerId="ADAL" clId="{A5D23ACE-F9BA-49A9-BAD5-57D3CE328640}" dt="2022-11-22T02:04:30.549" v="95" actId="1076"/>
           <ac:spMkLst>
             <pc:docMk/>
             <pc:sldMk cId="1778605326" sldId="257"/>
@@ -234,11 +234,19 @@
           </ac:spMkLst>
         </pc:spChg>
         <pc:spChg chg="mod">
-          <ac:chgData name="Sandra Klemet-N'guessan" userId="0d19dd2d-6e00-409e-9933-e191f280205d" providerId="ADAL" clId="{A5D23ACE-F9BA-49A9-BAD5-57D3CE328640}" dt="2022-11-18T13:34:15.104" v="68" actId="1076"/>
+          <ac:chgData name="Sandra Klemet-N'guessan" userId="0d19dd2d-6e00-409e-9933-e191f280205d" providerId="ADAL" clId="{A5D23ACE-F9BA-49A9-BAD5-57D3CE328640}" dt="2022-11-22T02:04:30.549" v="95" actId="1076"/>
           <ac:spMkLst>
             <pc:docMk/>
             <pc:sldMk cId="1778605326" sldId="257"/>
             <ac:spMk id="26" creationId="{E11A265D-510A-46F9-BBF6-68C579CE4F43}"/>
+          </ac:spMkLst>
+        </pc:spChg>
+        <pc:spChg chg="mod">
+          <ac:chgData name="Sandra Klemet-N'guessan" userId="0d19dd2d-6e00-409e-9933-e191f280205d" providerId="ADAL" clId="{A5D23ACE-F9BA-49A9-BAD5-57D3CE328640}" dt="2022-11-22T02:03:48.412" v="91" actId="1076"/>
+          <ac:spMkLst>
+            <pc:docMk/>
+            <pc:sldMk cId="1778605326" sldId="257"/>
+            <ac:spMk id="47" creationId="{8172D576-3A11-4AA7-8E8D-C868CF9DFEF6}"/>
           </ac:spMkLst>
         </pc:spChg>
         <pc:spChg chg="mod">
@@ -250,7 +258,7 @@
           </ac:spMkLst>
         </pc:spChg>
         <pc:spChg chg="mod">
-          <ac:chgData name="Sandra Klemet-N'guessan" userId="0d19dd2d-6e00-409e-9933-e191f280205d" providerId="ADAL" clId="{A5D23ACE-F9BA-49A9-BAD5-57D3CE328640}" dt="2022-11-18T13:34:15.104" v="68" actId="1076"/>
+          <ac:chgData name="Sandra Klemet-N'guessan" userId="0d19dd2d-6e00-409e-9933-e191f280205d" providerId="ADAL" clId="{A5D23ACE-F9BA-49A9-BAD5-57D3CE328640}" dt="2022-11-22T02:04:30.549" v="95" actId="1076"/>
           <ac:spMkLst>
             <pc:docMk/>
             <pc:sldMk cId="1778605326" sldId="257"/>
@@ -258,7 +266,7 @@
           </ac:spMkLst>
         </pc:spChg>
         <pc:spChg chg="mod">
-          <ac:chgData name="Sandra Klemet-N'guessan" userId="0d19dd2d-6e00-409e-9933-e191f280205d" providerId="ADAL" clId="{A5D23ACE-F9BA-49A9-BAD5-57D3CE328640}" dt="2022-11-18T13:34:15.104" v="68" actId="1076"/>
+          <ac:chgData name="Sandra Klemet-N'guessan" userId="0d19dd2d-6e00-409e-9933-e191f280205d" providerId="ADAL" clId="{A5D23ACE-F9BA-49A9-BAD5-57D3CE328640}" dt="2022-11-22T02:04:30.549" v="95" actId="1076"/>
           <ac:spMkLst>
             <pc:docMk/>
             <pc:sldMk cId="1778605326" sldId="257"/>
@@ -266,7 +274,7 @@
           </ac:spMkLst>
         </pc:spChg>
         <pc:spChg chg="mod">
-          <ac:chgData name="Sandra Klemet-N'guessan" userId="0d19dd2d-6e00-409e-9933-e191f280205d" providerId="ADAL" clId="{A5D23ACE-F9BA-49A9-BAD5-57D3CE328640}" dt="2022-11-18T13:34:15.104" v="68" actId="1076"/>
+          <ac:chgData name="Sandra Klemet-N'guessan" userId="0d19dd2d-6e00-409e-9933-e191f280205d" providerId="ADAL" clId="{A5D23ACE-F9BA-49A9-BAD5-57D3CE328640}" dt="2022-11-22T02:04:30.549" v="95" actId="1076"/>
           <ac:spMkLst>
             <pc:docMk/>
             <pc:sldMk cId="1778605326" sldId="257"/>
@@ -298,7 +306,7 @@
           </ac:picMkLst>
         </pc:picChg>
         <pc:picChg chg="add mod">
-          <ac:chgData name="Sandra Klemet-N'guessan" userId="0d19dd2d-6e00-409e-9933-e191f280205d" providerId="ADAL" clId="{A5D23ACE-F9BA-49A9-BAD5-57D3CE328640}" dt="2022-11-18T13:36:43.682" v="83" actId="1076"/>
+          <ac:chgData name="Sandra Klemet-N'guessan" userId="0d19dd2d-6e00-409e-9933-e191f280205d" providerId="ADAL" clId="{A5D23ACE-F9BA-49A9-BAD5-57D3CE328640}" dt="2022-11-22T02:04:35.818" v="96" actId="1076"/>
           <ac:picMkLst>
             <pc:docMk/>
             <pc:sldMk cId="1778605326" sldId="257"/>
@@ -468,7 +476,7 @@
           <a:p>
             <a:fld id="{BCB0F96B-91F1-424C-AA1F-3F0943DBBE38}" type="datetimeFigureOut">
               <a:rPr lang="en-CA" smtClean="0"/>
-              <a:t>2022-11-17</a:t>
+              <a:t>2022-11-21</a:t>
             </a:fld>
             <a:endParaRPr lang="en-CA"/>
           </a:p>
@@ -668,7 +676,7 @@
           <a:p>
             <a:fld id="{BCB0F96B-91F1-424C-AA1F-3F0943DBBE38}" type="datetimeFigureOut">
               <a:rPr lang="en-CA" smtClean="0"/>
-              <a:t>2022-11-17</a:t>
+              <a:t>2022-11-21</a:t>
             </a:fld>
             <a:endParaRPr lang="en-CA"/>
           </a:p>
@@ -878,7 +886,7 @@
           <a:p>
             <a:fld id="{BCB0F96B-91F1-424C-AA1F-3F0943DBBE38}" type="datetimeFigureOut">
               <a:rPr lang="en-CA" smtClean="0"/>
-              <a:t>2022-11-17</a:t>
+              <a:t>2022-11-21</a:t>
             </a:fld>
             <a:endParaRPr lang="en-CA"/>
           </a:p>
@@ -1078,7 +1086,7 @@
           <a:p>
             <a:fld id="{BCB0F96B-91F1-424C-AA1F-3F0943DBBE38}" type="datetimeFigureOut">
               <a:rPr lang="en-CA" smtClean="0"/>
-              <a:t>2022-11-17</a:t>
+              <a:t>2022-11-21</a:t>
             </a:fld>
             <a:endParaRPr lang="en-CA"/>
           </a:p>
@@ -1354,7 +1362,7 @@
           <a:p>
             <a:fld id="{BCB0F96B-91F1-424C-AA1F-3F0943DBBE38}" type="datetimeFigureOut">
               <a:rPr lang="en-CA" smtClean="0"/>
-              <a:t>2022-11-17</a:t>
+              <a:t>2022-11-21</a:t>
             </a:fld>
             <a:endParaRPr lang="en-CA"/>
           </a:p>
@@ -1622,7 +1630,7 @@
           <a:p>
             <a:fld id="{BCB0F96B-91F1-424C-AA1F-3F0943DBBE38}" type="datetimeFigureOut">
               <a:rPr lang="en-CA" smtClean="0"/>
-              <a:t>2022-11-17</a:t>
+              <a:t>2022-11-21</a:t>
             </a:fld>
             <a:endParaRPr lang="en-CA"/>
           </a:p>
@@ -2037,7 +2045,7 @@
           <a:p>
             <a:fld id="{BCB0F96B-91F1-424C-AA1F-3F0943DBBE38}" type="datetimeFigureOut">
               <a:rPr lang="en-CA" smtClean="0"/>
-              <a:t>2022-11-17</a:t>
+              <a:t>2022-11-21</a:t>
             </a:fld>
             <a:endParaRPr lang="en-CA"/>
           </a:p>
@@ -2179,7 +2187,7 @@
           <a:p>
             <a:fld id="{BCB0F96B-91F1-424C-AA1F-3F0943DBBE38}" type="datetimeFigureOut">
               <a:rPr lang="en-CA" smtClean="0"/>
-              <a:t>2022-11-17</a:t>
+              <a:t>2022-11-21</a:t>
             </a:fld>
             <a:endParaRPr lang="en-CA"/>
           </a:p>
@@ -2292,7 +2300,7 @@
           <a:p>
             <a:fld id="{BCB0F96B-91F1-424C-AA1F-3F0943DBBE38}" type="datetimeFigureOut">
               <a:rPr lang="en-CA" smtClean="0"/>
-              <a:t>2022-11-17</a:t>
+              <a:t>2022-11-21</a:t>
             </a:fld>
             <a:endParaRPr lang="en-CA"/>
           </a:p>
@@ -2605,7 +2613,7 @@
           <a:p>
             <a:fld id="{BCB0F96B-91F1-424C-AA1F-3F0943DBBE38}" type="datetimeFigureOut">
               <a:rPr lang="en-CA" smtClean="0"/>
-              <a:t>2022-11-17</a:t>
+              <a:t>2022-11-21</a:t>
             </a:fld>
             <a:endParaRPr lang="en-CA"/>
           </a:p>
@@ -2894,7 +2902,7 @@
           <a:p>
             <a:fld id="{BCB0F96B-91F1-424C-AA1F-3F0943DBBE38}" type="datetimeFigureOut">
               <a:rPr lang="en-CA" smtClean="0"/>
-              <a:t>2022-11-17</a:t>
+              <a:t>2022-11-21</a:t>
             </a:fld>
             <a:endParaRPr lang="en-CA"/>
           </a:p>
@@ -3137,7 +3145,7 @@
           <a:p>
             <a:fld id="{BCB0F96B-91F1-424C-AA1F-3F0943DBBE38}" type="datetimeFigureOut">
               <a:rPr lang="en-CA" smtClean="0"/>
-              <a:t>2022-11-17</a:t>
+              <a:t>2022-11-21</a:t>
             </a:fld>
             <a:endParaRPr lang="en-CA"/>
           </a:p>
@@ -3812,7 +3820,7 @@
         </p:nvSpPr>
         <p:spPr>
           <a:xfrm>
-            <a:off x="7923306" y="1944449"/>
+            <a:off x="7204323" y="2546573"/>
             <a:ext cx="4206088" cy="1323439"/>
           </a:xfrm>
           <a:prstGeom prst="rect">
@@ -3970,7 +3978,7 @@
         </p:nvSpPr>
         <p:spPr>
           <a:xfrm rot="5400000">
-            <a:off x="8377539" y="4479177"/>
+            <a:off x="7392019" y="4755412"/>
             <a:ext cx="307243" cy="1047891"/>
           </a:xfrm>
           <a:prstGeom prst="curvedConnector2">
@@ -4028,7 +4036,7 @@
         </p:nvSpPr>
         <p:spPr>
           <a:xfrm>
-            <a:off x="10229563" y="5545964"/>
+            <a:off x="9244043" y="5822199"/>
             <a:ext cx="894329" cy="646331"/>
           </a:xfrm>
           <a:prstGeom prst="rect">
@@ -4069,7 +4077,7 @@
         </p:nvSpPr>
         <p:spPr>
           <a:xfrm>
-            <a:off x="7108150" y="4829095"/>
+            <a:off x="6122630" y="5105330"/>
             <a:ext cx="796083" cy="646331"/>
           </a:xfrm>
           <a:prstGeom prst="rect">
@@ -4210,7 +4218,7 @@
         </p:nvSpPr>
         <p:spPr>
           <a:xfrm rot="5400000">
-            <a:off x="8231897" y="5140729"/>
+            <a:off x="7246377" y="5416964"/>
             <a:ext cx="1198094" cy="708797"/>
           </a:xfrm>
           <a:prstGeom prst="curvedConnector2">
@@ -4268,7 +4276,7 @@
         </p:nvSpPr>
         <p:spPr>
           <a:xfrm>
-            <a:off x="7653912" y="5788143"/>
+            <a:off x="6668392" y="6064378"/>
             <a:ext cx="532930" cy="646331"/>
           </a:xfrm>
           <a:prstGeom prst="rect">
@@ -4309,7 +4317,7 @@
         </p:nvSpPr>
         <p:spPr>
           <a:xfrm rot="5400000" flipV="1">
-            <a:off x="9213413" y="5031528"/>
+            <a:off x="8227893" y="5307763"/>
             <a:ext cx="963302" cy="744470"/>
           </a:xfrm>
           <a:prstGeom prst="curvedConnector2">
@@ -4475,7 +4483,7 @@
         </p:nvSpPr>
         <p:spPr>
           <a:xfrm>
-            <a:off x="7055306" y="4788687"/>
+            <a:off x="6069786" y="5064922"/>
             <a:ext cx="864000" cy="720000"/>
           </a:xfrm>
           <a:prstGeom prst="hexagon">
@@ -4529,7 +4537,7 @@
         </p:nvSpPr>
         <p:spPr>
           <a:xfrm>
-            <a:off x="7491306" y="5751309"/>
+            <a:off x="6505786" y="6027544"/>
             <a:ext cx="864000" cy="720000"/>
           </a:xfrm>
           <a:prstGeom prst="hexagon">
@@ -4583,7 +4591,7 @@
         </p:nvSpPr>
         <p:spPr>
           <a:xfrm>
-            <a:off x="10188540" y="5545964"/>
+            <a:off x="9203020" y="5822199"/>
             <a:ext cx="864000" cy="720000"/>
           </a:xfrm>
           <a:prstGeom prst="hexagon">
@@ -4637,7 +4645,7 @@
         </p:nvSpPr>
         <p:spPr>
           <a:xfrm>
-            <a:off x="6104253" y="4833578"/>
+            <a:off x="5118733" y="5109813"/>
             <a:ext cx="796083" cy="646331"/>
           </a:xfrm>
           <a:prstGeom prst="rect">
@@ -4679,7 +4687,7 @@
         </p:nvSpPr>
         <p:spPr>
           <a:xfrm>
-            <a:off x="6051409" y="4793170"/>
+            <a:off x="5065889" y="5069405"/>
             <a:ext cx="864000" cy="720000"/>
           </a:xfrm>
           <a:prstGeom prst="hexagon">
@@ -4868,7 +4876,7 @@
         </p:blipFill>
         <p:spPr>
           <a:xfrm rot="4133417">
-            <a:off x="7394534" y="1710999"/>
+            <a:off x="6328547" y="2048400"/>
             <a:ext cx="3856590" cy="5142120"/>
           </a:xfrm>
           <a:prstGeom prst="rect">

</xml_diff>